<commit_message>
3-tier first and changed 2-tier image
</commit_message>
<xml_diff>
--- a/ImageCollections.pptx
+++ b/ImageCollections.pptx
@@ -8,7 +8,7 @@
     <p:sldMasterId id="2147483706" r:id="rId4"/>
   </p:sldMasterIdLst>
   <p:notesMasterIdLst>
-    <p:notesMasterId r:id="rId11"/>
+    <p:notesMasterId r:id="rId14"/>
   </p:notesMasterIdLst>
   <p:sldIdLst>
     <p:sldId id="257" r:id="rId5"/>
@@ -17,6 +17,9 @@
     <p:sldId id="260" r:id="rId8"/>
     <p:sldId id="261" r:id="rId9"/>
     <p:sldId id="264" r:id="rId10"/>
+    <p:sldId id="265" r:id="rId11"/>
+    <p:sldId id="266" r:id="rId12"/>
+    <p:sldId id="267" r:id="rId13"/>
   </p:sldIdLst>
   <p:sldSz cx="9906000" cy="6858000" type="A4"/>
   <p:notesSz cx="6858000" cy="9144000"/>
@@ -200,7 +203,7 @@
           <a:p>
             <a:fld id="{D5FB8914-1EE9-482B-A76D-0B3E2425C990}" type="datetimeFigureOut">
               <a:rPr lang="id-ID" smtClean="0"/>
-              <a:t>22/09/2011</a:t>
+              <a:t>23/09/2011</a:t>
             </a:fld>
             <a:endParaRPr lang="id-ID"/>
           </a:p>
@@ -9661,7 +9664,7 @@
           <a:p>
             <a:fld id="{0523637D-6369-4252-877F-060E6520BEB9}" type="datetimeFigureOut">
               <a:rPr lang="id-ID" smtClean="0"/>
-              <a:t>22/09/2011</a:t>
+              <a:t>23/09/2011</a:t>
             </a:fld>
             <a:endParaRPr lang="id-ID"/>
           </a:p>
@@ -9831,7 +9834,7 @@
           <a:p>
             <a:fld id="{0523637D-6369-4252-877F-060E6520BEB9}" type="datetimeFigureOut">
               <a:rPr lang="id-ID" smtClean="0"/>
-              <a:t>22/09/2011</a:t>
+              <a:t>23/09/2011</a:t>
             </a:fld>
             <a:endParaRPr lang="id-ID"/>
           </a:p>
@@ -10087,7 +10090,7 @@
           <a:p>
             <a:fld id="{0523637D-6369-4252-877F-060E6520BEB9}" type="datetimeFigureOut">
               <a:rPr lang="id-ID" smtClean="0"/>
-              <a:t>22/09/2011</a:t>
+              <a:t>23/09/2011</a:t>
             </a:fld>
             <a:endParaRPr lang="id-ID"/>
           </a:p>
@@ -10375,7 +10378,7 @@
           <a:p>
             <a:fld id="{0523637D-6369-4252-877F-060E6520BEB9}" type="datetimeFigureOut">
               <a:rPr lang="id-ID" smtClean="0"/>
-              <a:t>22/09/2011</a:t>
+              <a:t>23/09/2011</a:t>
             </a:fld>
             <a:endParaRPr lang="id-ID"/>
           </a:p>
@@ -10797,7 +10800,7 @@
           <a:p>
             <a:fld id="{0523637D-6369-4252-877F-060E6520BEB9}" type="datetimeFigureOut">
               <a:rPr lang="id-ID" smtClean="0"/>
-              <a:t>22/09/2011</a:t>
+              <a:t>23/09/2011</a:t>
             </a:fld>
             <a:endParaRPr lang="id-ID"/>
           </a:p>
@@ -10915,7 +10918,7 @@
           <a:p>
             <a:fld id="{0523637D-6369-4252-877F-060E6520BEB9}" type="datetimeFigureOut">
               <a:rPr lang="id-ID" smtClean="0"/>
-              <a:t>22/09/2011</a:t>
+              <a:t>23/09/2011</a:t>
             </a:fld>
             <a:endParaRPr lang="id-ID"/>
           </a:p>
@@ -11285,7 +11288,7 @@
           <a:p>
             <a:fld id="{0523637D-6369-4252-877F-060E6520BEB9}" type="datetimeFigureOut">
               <a:rPr lang="id-ID" smtClean="0"/>
-              <a:t>22/09/2011</a:t>
+              <a:t>23/09/2011</a:t>
             </a:fld>
             <a:endParaRPr lang="id-ID"/>
           </a:p>
@@ -11562,7 +11565,7 @@
           <a:p>
             <a:fld id="{0523637D-6369-4252-877F-060E6520BEB9}" type="datetimeFigureOut">
               <a:rPr lang="id-ID" smtClean="0"/>
-              <a:t>22/09/2011</a:t>
+              <a:t>23/09/2011</a:t>
             </a:fld>
             <a:endParaRPr lang="id-ID"/>
           </a:p>
@@ -11815,7 +11818,7 @@
           <a:p>
             <a:fld id="{0523637D-6369-4252-877F-060E6520BEB9}" type="datetimeFigureOut">
               <a:rPr lang="id-ID" smtClean="0"/>
-              <a:t>22/09/2011</a:t>
+              <a:t>23/09/2011</a:t>
             </a:fld>
             <a:endParaRPr lang="id-ID"/>
           </a:p>
@@ -11985,7 +11988,7 @@
           <a:p>
             <a:fld id="{0523637D-6369-4252-877F-060E6520BEB9}" type="datetimeFigureOut">
               <a:rPr lang="id-ID" smtClean="0"/>
-              <a:t>22/09/2011</a:t>
+              <a:t>23/09/2011</a:t>
             </a:fld>
             <a:endParaRPr lang="id-ID"/>
           </a:p>
@@ -12165,7 +12168,7 @@
           <a:p>
             <a:fld id="{0523637D-6369-4252-877F-060E6520BEB9}" type="datetimeFigureOut">
               <a:rPr lang="id-ID" smtClean="0"/>
-              <a:t>22/09/2011</a:t>
+              <a:t>23/09/2011</a:t>
             </a:fld>
             <a:endParaRPr lang="id-ID"/>
           </a:p>
@@ -14682,7 +14685,7 @@
           <a:p>
             <a:fld id="{0523637D-6369-4252-877F-060E6520BEB9}" type="datetimeFigureOut">
               <a:rPr lang="id-ID" smtClean="0"/>
-              <a:t>22/09/2011</a:t>
+              <a:t>23/09/2011</a:t>
             </a:fld>
             <a:endParaRPr lang="id-ID"/>
           </a:p>
@@ -15591,6 +15594,284 @@
       </p:par>
     </p:tnLst>
   </p:timing>
+</p:sld>
+</file>
+
+<file path=ppt/slides/slide7.xml><?xml version="1.0" encoding="utf-8"?>
+<p:sld xmlns:a="http://schemas.openxmlformats.org/drawingml/2006/main" xmlns:r="http://schemas.openxmlformats.org/officeDocument/2006/relationships" xmlns:p="http://schemas.openxmlformats.org/presentationml/2006/main">
+  <p:cSld>
+    <p:spTree>
+      <p:nvGrpSpPr>
+        <p:cNvPr id="1" name=""/>
+        <p:cNvGrpSpPr/>
+        <p:nvPr/>
+      </p:nvGrpSpPr>
+      <p:grpSpPr>
+        <a:xfrm>
+          <a:off x="0" y="0"/>
+          <a:ext cx="0" cy="0"/>
+          <a:chOff x="0" y="0"/>
+          <a:chExt cx="0" cy="0"/>
+        </a:xfrm>
+      </p:grpSpPr>
+      <p:pic>
+        <p:nvPicPr>
+          <p:cNvPr id="5" name="Picture 2" descr="http://blogs.msdn.com/cfs-filesystemfile.ashx/__key/communityserver-blogs-components-weblogfiles/00-00-00-81-88-metablogapi/7382.image361_5F00_6FF74675.png"/>
+          <p:cNvPicPr>
+            <a:picLocks noChangeAspect="1" noChangeArrowheads="1"/>
+          </p:cNvPicPr>
+          <p:nvPr/>
+        </p:nvPicPr>
+        <p:blipFill>
+          <a:blip r:embed="rId2">
+            <a:extLst>
+              <a:ext uri="{28A0092B-C50C-407E-A947-70E740481C1C}">
+                <a14:useLocalDpi xmlns:a14="http://schemas.microsoft.com/office/drawing/2010/main" val="0"/>
+              </a:ext>
+            </a:extLst>
+          </a:blip>
+          <a:srcRect/>
+          <a:stretch>
+            <a:fillRect/>
+          </a:stretch>
+        </p:blipFill>
+        <p:spPr bwMode="auto">
+          <a:xfrm>
+            <a:off x="755576" y="372049"/>
+            <a:ext cx="7344816" cy="5938363"/>
+          </a:xfrm>
+          <a:prstGeom prst="rect">
+            <a:avLst/>
+          </a:prstGeom>
+          <a:noFill/>
+          <a:extLst>
+            <a:ext uri="{909E8E84-426E-40DD-AFC4-6F175D3DCCD1}">
+              <a14:hiddenFill xmlns:a14="http://schemas.microsoft.com/office/drawing/2010/main">
+                <a:solidFill>
+                  <a:srgbClr val="FFFFFF"/>
+                </a:solidFill>
+              </a14:hiddenFill>
+            </a:ext>
+          </a:extLst>
+        </p:spPr>
+      </p:pic>
+    </p:spTree>
+    <p:extLst>
+      <p:ext uri="{BB962C8B-B14F-4D97-AF65-F5344CB8AC3E}">
+        <p14:creationId xmlns:p14="http://schemas.microsoft.com/office/powerpoint/2010/main" val="3580263854"/>
+      </p:ext>
+    </p:extLst>
+  </p:cSld>
+  <p:clrMapOvr>
+    <a:masterClrMapping/>
+  </p:clrMapOvr>
+  <p:transition>
+    <p:fade/>
+  </p:transition>
+</p:sld>
+</file>
+
+<file path=ppt/slides/slide8.xml><?xml version="1.0" encoding="utf-8"?>
+<p:sld xmlns:a="http://schemas.openxmlformats.org/drawingml/2006/main" xmlns:r="http://schemas.openxmlformats.org/officeDocument/2006/relationships" xmlns:p="http://schemas.openxmlformats.org/presentationml/2006/main">
+  <p:cSld>
+    <p:spTree>
+      <p:nvGrpSpPr>
+        <p:cNvPr id="1" name=""/>
+        <p:cNvGrpSpPr/>
+        <p:nvPr/>
+      </p:nvGrpSpPr>
+      <p:grpSpPr>
+        <a:xfrm>
+          <a:off x="0" y="0"/>
+          <a:ext cx="0" cy="0"/>
+          <a:chOff x="0" y="0"/>
+          <a:chExt cx="0" cy="0"/>
+        </a:xfrm>
+      </p:grpSpPr>
+      <p:pic>
+        <p:nvPicPr>
+          <p:cNvPr id="1026" name="Picture 2"/>
+          <p:cNvPicPr>
+            <a:picLocks noChangeAspect="1" noChangeArrowheads="1"/>
+          </p:cNvPicPr>
+          <p:nvPr/>
+        </p:nvPicPr>
+        <p:blipFill>
+          <a:blip r:embed="rId2">
+            <a:extLst>
+              <a:ext uri="{28A0092B-C50C-407E-A947-70E740481C1C}">
+                <a14:useLocalDpi xmlns:a14="http://schemas.microsoft.com/office/drawing/2010/main" val="0"/>
+              </a:ext>
+            </a:extLst>
+          </a:blip>
+          <a:srcRect/>
+          <a:stretch>
+            <a:fillRect/>
+          </a:stretch>
+        </p:blipFill>
+        <p:spPr bwMode="auto">
+          <a:xfrm>
+            <a:off x="1328738" y="200025"/>
+            <a:ext cx="7246937" cy="6456363"/>
+          </a:xfrm>
+          <a:prstGeom prst="rect">
+            <a:avLst/>
+          </a:prstGeom>
+          <a:noFill/>
+          <a:ln>
+            <a:noFill/>
+          </a:ln>
+          <a:effectLst/>
+          <a:extLst>
+            <a:ext uri="{909E8E84-426E-40DD-AFC4-6F175D3DCCD1}">
+              <a14:hiddenFill xmlns:a14="http://schemas.microsoft.com/office/drawing/2010/main">
+                <a:solidFill>
+                  <a:schemeClr val="accent1"/>
+                </a:solidFill>
+              </a14:hiddenFill>
+            </a:ext>
+            <a:ext uri="{91240B29-F687-4F45-9708-019B960494DF}">
+              <a14:hiddenLine xmlns:a14="http://schemas.microsoft.com/office/drawing/2010/main" w="9525">
+                <a:solidFill>
+                  <a:schemeClr val="tx1"/>
+                </a:solidFill>
+                <a:miter lim="800000"/>
+                <a:headEnd/>
+                <a:tailEnd/>
+              </a14:hiddenLine>
+            </a:ext>
+            <a:ext uri="{AF507438-7753-43E0-B8FC-AC1667EBCBE1}">
+              <a14:hiddenEffects xmlns:a14="http://schemas.microsoft.com/office/drawing/2010/main">
+                <a:effectLst>
+                  <a:outerShdw dist="35921" dir="2700000" algn="ctr" rotWithShape="0">
+                    <a:schemeClr val="bg2"/>
+                  </a:outerShdw>
+                </a:effectLst>
+              </a14:hiddenEffects>
+            </a:ext>
+          </a:extLst>
+        </p:spPr>
+      </p:pic>
+    </p:spTree>
+    <p:extLst>
+      <p:ext uri="{BB962C8B-B14F-4D97-AF65-F5344CB8AC3E}">
+        <p14:creationId xmlns:p14="http://schemas.microsoft.com/office/powerpoint/2010/main" val="2628145014"/>
+      </p:ext>
+    </p:extLst>
+  </p:cSld>
+  <p:clrMapOvr>
+    <a:masterClrMapping/>
+  </p:clrMapOvr>
+  <p:transition>
+    <p:fade/>
+  </p:transition>
+</p:sld>
+</file>
+
+<file path=ppt/slides/slide9.xml><?xml version="1.0" encoding="utf-8"?>
+<p:sld xmlns:a="http://schemas.openxmlformats.org/drawingml/2006/main" xmlns:r="http://schemas.openxmlformats.org/officeDocument/2006/relationships" xmlns:p="http://schemas.openxmlformats.org/presentationml/2006/main">
+  <p:cSld>
+    <p:spTree>
+      <p:nvGrpSpPr>
+        <p:cNvPr id="1" name=""/>
+        <p:cNvGrpSpPr/>
+        <p:nvPr/>
+      </p:nvGrpSpPr>
+      <p:grpSpPr>
+        <a:xfrm>
+          <a:off x="0" y="0"/>
+          <a:ext cx="0" cy="0"/>
+          <a:chOff x="0" y="0"/>
+          <a:chExt cx="0" cy="0"/>
+        </a:xfrm>
+      </p:grpSpPr>
+      <p:pic>
+        <p:nvPicPr>
+          <p:cNvPr id="3" name="Picture 4" descr="http://static.smartpassiveincome.com/wp-content/uploads/2010/01/blog-profit.jpg"/>
+          <p:cNvPicPr>
+            <a:picLocks noChangeAspect="1" noChangeArrowheads="1"/>
+          </p:cNvPicPr>
+          <p:nvPr/>
+        </p:nvPicPr>
+        <p:blipFill>
+          <a:blip r:embed="rId2">
+            <a:extLst>
+              <a:ext uri="{28A0092B-C50C-407E-A947-70E740481C1C}">
+                <a14:useLocalDpi xmlns:a14="http://schemas.microsoft.com/office/drawing/2010/main" val="0"/>
+              </a:ext>
+            </a:extLst>
+          </a:blip>
+          <a:srcRect/>
+          <a:stretch>
+            <a:fillRect/>
+          </a:stretch>
+        </p:blipFill>
+        <p:spPr bwMode="auto">
+          <a:xfrm>
+            <a:off x="971600" y="836712"/>
+            <a:ext cx="7416824" cy="5562618"/>
+          </a:xfrm>
+          <a:prstGeom prst="rect">
+            <a:avLst/>
+          </a:prstGeom>
+          <a:noFill/>
+          <a:extLst>
+            <a:ext uri="{909E8E84-426E-40DD-AFC4-6F175D3DCCD1}">
+              <a14:hiddenFill xmlns:a14="http://schemas.microsoft.com/office/drawing/2010/main">
+                <a:solidFill>
+                  <a:srgbClr val="FFFFFF"/>
+                </a:solidFill>
+              </a14:hiddenFill>
+            </a:ext>
+          </a:extLst>
+        </p:spPr>
+      </p:pic>
+      <p:sp>
+        <p:nvSpPr>
+          <p:cNvPr id="4" name="TextBox 3"/>
+          <p:cNvSpPr txBox="1"/>
+          <p:nvPr/>
+        </p:nvSpPr>
+        <p:spPr>
+          <a:xfrm>
+            <a:off x="107504" y="6511343"/>
+            <a:ext cx="5004896" cy="246221"/>
+          </a:xfrm>
+          <a:prstGeom prst="rect">
+            <a:avLst/>
+          </a:prstGeom>
+          <a:noFill/>
+        </p:spPr>
+        <p:txBody>
+          <a:bodyPr wrap="none" rtlCol="0">
+            <a:spAutoFit/>
+          </a:bodyPr>
+          <a:lstStyle/>
+          <a:p>
+            <a:r>
+              <a:rPr lang="id-ID" sz="1000" dirty="0" smtClean="0"/>
+              <a:t>img src: </a:t>
+            </a:r>
+            <a:r>
+              <a:rPr lang="id-ID" sz="1000" dirty="0"/>
+              <a:t>http://static.smartpassiveincome.com/wp-content/uploads/2010/01/blog-profit.jpg</a:t>
+            </a:r>
+          </a:p>
+        </p:txBody>
+      </p:sp>
+    </p:spTree>
+    <p:extLst>
+      <p:ext uri="{BB962C8B-B14F-4D97-AF65-F5344CB8AC3E}">
+        <p14:creationId xmlns:p14="http://schemas.microsoft.com/office/powerpoint/2010/main" val="1015385507"/>
+      </p:ext>
+    </p:extLst>
+  </p:cSld>
+  <p:clrMapOvr>
+    <a:masterClrMapping/>
+  </p:clrMapOvr>
+  <p:transition>
+    <p:fade/>
+  </p:transition>
 </p:sld>
 </file>
 

</xml_diff>